<commit_message>
Finished producer and consumer, fixed docker compose for kafka cluster
</commit_message>
<xml_diff>
--- a/prez/Kafka v kostce.pptx
+++ b/prez/Kafka v kostce.pptx
@@ -692,6 +692,225 @@
     </a:lvl9pPr>
   </p:notesStyle>
 </p:notesMaster>
+</file>
+
+<file path=ppt/notesSlides/notesSlide1.xml><?xml version="1.0" encoding="utf-8"?>
+<p:notes xmlns:a="http://schemas.openxmlformats.org/drawingml/2006/main" xmlns:r="http://schemas.openxmlformats.org/officeDocument/2006/relationships" xmlns:p="http://schemas.openxmlformats.org/presentationml/2006/main">
+  <p:cSld>
+    <p:spTree>
+      <p:nvGrpSpPr>
+        <p:cNvPr id="1" name=""/>
+        <p:cNvGrpSpPr/>
+        <p:nvPr/>
+      </p:nvGrpSpPr>
+      <p:grpSpPr>
+        <a:xfrm>
+          <a:off x="0" y="0"/>
+          <a:ext cx="0" cy="0"/>
+          <a:chOff x="0" y="0"/>
+          <a:chExt cx="0" cy="0"/>
+        </a:xfrm>
+      </p:grpSpPr>
+      <p:sp>
+        <p:nvSpPr>
+          <p:cNvPr id="2" name="Slide Image Placeholder 1"/>
+          <p:cNvSpPr>
+            <a:spLocks noGrp="1" noRot="1" noChangeAspect="1"/>
+          </p:cNvSpPr>
+          <p:nvPr>
+            <p:ph type="sldImg"/>
+          </p:nvPr>
+        </p:nvSpPr>
+        <p:spPr/>
+      </p:sp>
+      <p:sp>
+        <p:nvSpPr>
+          <p:cNvPr id="3" name="Notes Placeholder 2"/>
+          <p:cNvSpPr>
+            <a:spLocks noGrp="1"/>
+          </p:cNvSpPr>
+          <p:nvPr>
+            <p:ph type="body" idx="1"/>
+          </p:nvPr>
+        </p:nvSpPr>
+        <p:spPr/>
+        <p:txBody>
+          <a:bodyPr/>
+          <a:lstStyle/>
+          <a:p>
+            <a:endParaRPr lang="en-US"/>
+          </a:p>
+        </p:txBody>
+      </p:sp>
+      <p:sp>
+        <p:nvSpPr>
+          <p:cNvPr id="4" name="Slide Number Placeholder 3"/>
+          <p:cNvSpPr>
+            <a:spLocks noGrp="1"/>
+          </p:cNvSpPr>
+          <p:nvPr>
+            <p:ph type="sldNum" sz="quarter" idx="5"/>
+          </p:nvPr>
+        </p:nvSpPr>
+        <p:spPr/>
+        <p:txBody>
+          <a:bodyPr/>
+          <a:lstStyle/>
+          <a:p>
+            <a:fld id="{B20AC5D2-7760-C24A-83B6-2E8A1C1DB8E2}" type="slidenum">
+              <a:rPr lang="en-US"/>
+              <a:t>15</a:t>
+            </a:fld>
+            <a:endParaRPr lang="en-US"/>
+          </a:p>
+        </p:txBody>
+      </p:sp>
+    </p:spTree>
+    <p:extLst>
+      <p:ext uri="{BB962C8B-B14F-4D97-AF65-F5344CB8AC3E}">
+        <p14:creationId xmlns:p14="http://schemas.microsoft.com/office/powerpoint/2010/main" val="3623078455"/>
+      </p:ext>
+    </p:extLst>
+  </p:cSld>
+  <p:clrMapOvr>
+    <a:masterClrMapping/>
+  </p:clrMapOvr>
+</p:notes>
+</file>
+
+<file path=ppt/notesSlides/notesSlide2.xml><?xml version="1.0" encoding="utf-8"?>
+<p:notes xmlns:a="http://schemas.openxmlformats.org/drawingml/2006/main" xmlns:r="http://schemas.openxmlformats.org/officeDocument/2006/relationships" xmlns:p="http://schemas.openxmlformats.org/presentationml/2006/main">
+  <p:cSld>
+    <p:spTree>
+      <p:nvGrpSpPr>
+        <p:cNvPr id="1" name=""/>
+        <p:cNvGrpSpPr/>
+        <p:nvPr/>
+      </p:nvGrpSpPr>
+      <p:grpSpPr>
+        <a:xfrm>
+          <a:off x="0" y="0"/>
+          <a:ext cx="0" cy="0"/>
+          <a:chOff x="0" y="0"/>
+          <a:chExt cx="0" cy="0"/>
+        </a:xfrm>
+      </p:grpSpPr>
+      <p:sp>
+        <p:nvSpPr>
+          <p:cNvPr id="2" name="Slide Image Placeholder 1"/>
+          <p:cNvSpPr>
+            <a:spLocks noGrp="1" noRot="1" noChangeAspect="1"/>
+          </p:cNvSpPr>
+          <p:nvPr>
+            <p:ph type="sldImg"/>
+          </p:nvPr>
+        </p:nvSpPr>
+        <p:spPr/>
+      </p:sp>
+      <p:sp>
+        <p:nvSpPr>
+          <p:cNvPr id="3" name="Notes Placeholder 2"/>
+          <p:cNvSpPr>
+            <a:spLocks noGrp="1"/>
+          </p:cNvSpPr>
+          <p:nvPr>
+            <p:ph type="body" idx="1"/>
+          </p:nvPr>
+        </p:nvSpPr>
+        <p:spPr/>
+        <p:txBody>
+          <a:bodyPr/>
+          <a:lstStyle/>
+          <a:p>
+            <a:r>
+              <a:rPr lang="en-US"/>
+              <a:t>Zmínit zajímavé scénáře použití Kafky: compacted topics -&gt; data store, source of truth; event sourcing; </a:t>
+            </a:r>
+          </a:p>
+          <a:p>
+            <a:r>
+              <a:rPr lang="en-US"/>
+              <a:t>dynamicky vytvářené fronty – velmi levné “db tabulky”</a:t>
+            </a:r>
+          </a:p>
+          <a:p>
+            <a:r>
+              <a:rPr lang="en-US"/>
+              <a:t>prioritizace zpráv (custom partitioning), ksqlDB</a:t>
+            </a:r>
+          </a:p>
+          <a:p>
+            <a:endParaRPr lang="en-US"/>
+          </a:p>
+          <a:p>
+            <a:r>
+              <a:rPr lang="en-US"/>
+              <a:t>Retence – záznamy jsou odmazávány po dosažení limitu na partitions (čas, objem...)</a:t>
+            </a:r>
+          </a:p>
+          <a:p>
+            <a:endParaRPr lang="en-US"/>
+          </a:p>
+          <a:p>
+            <a:r>
+              <a:rPr lang="en-US"/>
+              <a:t>Idenpotence – TODO</a:t>
+            </a:r>
+          </a:p>
+          <a:p>
+            <a:endParaRPr lang="en-US"/>
+          </a:p>
+          <a:p>
+            <a:r>
+              <a:rPr lang="en-US"/>
+              <a:t>Práce s CLI nástroji: naučte se to, připravte se na to, že je budete potřebovat. Existuje rest-proxy, která umožňuje dělat podobné věci přes HTTP API, ale ta není vždycky k disposici a neumožňuje všechno</a:t>
+            </a:r>
+          </a:p>
+          <a:p>
+            <a:endParaRPr lang="en-US"/>
+          </a:p>
+          <a:p>
+            <a:r>
+              <a:rPr lang="en-US"/>
+              <a:t>PortFW: Musí být dostupné všechny brokery – cesta přes hosts a extra loopback rozhraní</a:t>
+            </a:r>
+          </a:p>
+        </p:txBody>
+      </p:sp>
+      <p:sp>
+        <p:nvSpPr>
+          <p:cNvPr id="4" name="Slide Number Placeholder 3"/>
+          <p:cNvSpPr>
+            <a:spLocks noGrp="1"/>
+          </p:cNvSpPr>
+          <p:nvPr>
+            <p:ph type="sldNum" sz="quarter" idx="5"/>
+          </p:nvPr>
+        </p:nvSpPr>
+        <p:spPr/>
+        <p:txBody>
+          <a:bodyPr/>
+          <a:lstStyle/>
+          <a:p>
+            <a:fld id="{B20AC5D2-7760-C24A-83B6-2E8A1C1DB8E2}" type="slidenum">
+              <a:rPr lang="en-US"/>
+              <a:t>17</a:t>
+            </a:fld>
+            <a:endParaRPr lang="en-US"/>
+          </a:p>
+        </p:txBody>
+      </p:sp>
+    </p:spTree>
+    <p:extLst>
+      <p:ext uri="{BB962C8B-B14F-4D97-AF65-F5344CB8AC3E}">
+        <p14:creationId xmlns:p14="http://schemas.microsoft.com/office/powerpoint/2010/main" val="2702124223"/>
+      </p:ext>
+    </p:extLst>
+  </p:cSld>
+  <p:clrMapOvr>
+    <a:masterClrMapping/>
+  </p:clrMapOvr>
+</p:notes>
 </file>
 
 <file path=ppt/slideLayouts/slideLayout1.xml><?xml version="1.0" encoding="utf-8"?>
@@ -4106,6 +4325,63 @@
           </p:spPr>
         </p:pic>
       </p:grpSp>
+      <p:sp>
+        <p:nvSpPr>
+          <p:cNvPr id="7171" name="TextBox 7170">
+            <a:extLst>
+              <a:ext uri="{FF2B5EF4-FFF2-40B4-BE49-F238E27FC236}">
+                <a16:creationId xmlns:a16="http://schemas.microsoft.com/office/drawing/2014/main" id="{9A2EF853-8AFD-B04D-599A-2597FDE01604}"/>
+              </a:ext>
+            </a:extLst>
+          </p:cNvPr>
+          <p:cNvSpPr txBox="1"/>
+          <p:nvPr/>
+        </p:nvSpPr>
+        <p:spPr>
+          <a:xfrm>
+            <a:off x="362334" y="5359672"/>
+            <a:ext cx="6159064" cy="276999"/>
+          </a:xfrm>
+          <a:prstGeom prst="rect">
+            <a:avLst/>
+          </a:prstGeom>
+          <a:noFill/>
+        </p:spPr>
+        <p:txBody>
+          <a:bodyPr wrap="square" lIns="0" tIns="0" rIns="0" bIns="0" rtlCol="0" anchor="t" anchorCtr="0">
+            <a:spAutoFit/>
+          </a:bodyPr>
+          <a:lstStyle/>
+          <a:p>
+            <a:pPr marL="171450" indent="-171450" algn="l">
+              <a:buFont typeface="Wingdings" pitchFamily="2" charset="2"/>
+              <a:buChar char="§"/>
+            </a:pPr>
+            <a:r>
+              <a:rPr lang="en-US" dirty="0">
+                <a:solidFill>
+                  <a:schemeClr val="accent2">
+                    <a:lumMod val="50000"/>
+                  </a:schemeClr>
+                </a:solidFill>
+                <a:latin typeface="Arial" panose="020B0604020202020204" pitchFamily="34" charset="0"/>
+                <a:cs typeface="Arial" panose="020B0604020202020204" pitchFamily="34" charset="0"/>
+              </a:rPr>
+              <a:t>Záznamy z partition po přečtení </a:t>
+            </a:r>
+            <a:r>
+              <a:rPr lang="en-US" dirty="0">
+                <a:solidFill>
+                  <a:schemeClr val="tx2"/>
+                </a:solidFill>
+                <a:latin typeface="Arial" panose="020B0604020202020204" pitchFamily="34" charset="0"/>
+                <a:cs typeface="Arial" panose="020B0604020202020204" pitchFamily="34" charset="0"/>
+              </a:rPr>
+              <a:t>nemizí</a:t>
+            </a:r>
+          </a:p>
+        </p:txBody>
+      </p:sp>
     </p:spTree>
     <p:extLst>
       <p:ext uri="{BB962C8B-B14F-4D97-AF65-F5344CB8AC3E}">
@@ -4430,6 +4706,51 @@
                       </p:childTnLst>
                     </p:cTn>
                   </p:par>
+                  <p:par>
+                    <p:cTn id="29" fill="hold">
+                      <p:stCondLst>
+                        <p:cond delay="indefinite"/>
+                      </p:stCondLst>
+                      <p:childTnLst>
+                        <p:par>
+                          <p:cTn id="30" fill="hold">
+                            <p:stCondLst>
+                              <p:cond delay="0"/>
+                            </p:stCondLst>
+                            <p:childTnLst>
+                              <p:par>
+                                <p:cTn id="31" presetID="1" presetClass="entr" presetSubtype="0" fill="hold" grpId="0" nodeType="clickEffect">
+                                  <p:stCondLst>
+                                    <p:cond delay="0"/>
+                                  </p:stCondLst>
+                                  <p:childTnLst>
+                                    <p:set>
+                                      <p:cBhvr>
+                                        <p:cTn id="32" dur="1" fill="hold">
+                                          <p:stCondLst>
+                                            <p:cond delay="0"/>
+                                          </p:stCondLst>
+                                        </p:cTn>
+                                        <p:tgtEl>
+                                          <p:spTgt spid="7171"/>
+                                        </p:tgtEl>
+                                        <p:attrNameLst>
+                                          <p:attrName>style.visibility</p:attrName>
+                                        </p:attrNameLst>
+                                      </p:cBhvr>
+                                      <p:to>
+                                        <p:strVal val="visible"/>
+                                      </p:to>
+                                    </p:set>
+                                  </p:childTnLst>
+                                </p:cTn>
+                              </p:par>
+                            </p:childTnLst>
+                          </p:cTn>
+                        </p:par>
+                      </p:childTnLst>
+                    </p:cTn>
+                  </p:par>
                 </p:childTnLst>
               </p:cTn>
               <p:prevCondLst>
@@ -4457,6 +4778,7 @@
       <p:bldP spid="120" grpId="0"/>
       <p:bldP spid="121" grpId="0"/>
       <p:bldP spid="123" grpId="0"/>
+      <p:bldP spid="7171" grpId="0"/>
     </p:bldLst>
   </p:timing>
 </p:sld>
@@ -15624,7 +15946,7 @@
             <p:nvPr/>
           </p:nvPicPr>
           <p:blipFill>
-            <a:blip r:embed="rId2"/>
+            <a:blip r:embed="rId3"/>
             <a:stretch>
               <a:fillRect/>
             </a:stretch>
@@ -15781,7 +16103,7 @@
         </p:nvSpPr>
         <p:spPr>
           <a:xfrm>
-            <a:off x="358774" y="4092901"/>
+            <a:off x="358774" y="4539005"/>
             <a:ext cx="6427103" cy="553998"/>
           </a:xfrm>
           <a:prstGeom prst="rect">
@@ -15953,7 +16275,7 @@
             <p:nvPr/>
           </p:nvPicPr>
           <p:blipFill>
-            <a:blip r:embed="rId3"/>
+            <a:blip r:embed="rId4"/>
             <a:stretch>
               <a:fillRect/>
             </a:stretch>
@@ -16223,6 +16545,60 @@
           </p:txBody>
         </p:sp>
       </p:grpSp>
+      <p:sp>
+        <p:nvSpPr>
+          <p:cNvPr id="1079" name="TextBox 1078">
+            <a:extLst>
+              <a:ext uri="{FF2B5EF4-FFF2-40B4-BE49-F238E27FC236}">
+                <a16:creationId xmlns:a16="http://schemas.microsoft.com/office/drawing/2014/main" id="{92814B57-8CF5-B0A4-44F3-1CA492C8F630}"/>
+              </a:ext>
+            </a:extLst>
+          </p:cNvPr>
+          <p:cNvSpPr txBox="1"/>
+          <p:nvPr/>
+        </p:nvSpPr>
+        <p:spPr>
+          <a:xfrm>
+            <a:off x="362334" y="4007471"/>
+            <a:ext cx="6159064" cy="276999"/>
+          </a:xfrm>
+          <a:prstGeom prst="rect">
+            <a:avLst/>
+          </a:prstGeom>
+          <a:noFill/>
+        </p:spPr>
+        <p:txBody>
+          <a:bodyPr wrap="square" lIns="0" tIns="0" rIns="0" bIns="0" rtlCol="0" anchor="t" anchorCtr="0">
+            <a:spAutoFit/>
+          </a:bodyPr>
+          <a:lstStyle/>
+          <a:p>
+            <a:pPr marL="171450" indent="-171450" algn="l">
+              <a:buFont typeface="Wingdings" pitchFamily="2" charset="2"/>
+              <a:buChar char="§"/>
+            </a:pPr>
+            <a:r>
+              <a:rPr lang="en-US" dirty="0">
+                <a:solidFill>
+                  <a:schemeClr val="accent2">
+                    <a:lumMod val="50000"/>
+                  </a:schemeClr>
+                </a:solidFill>
+                <a:latin typeface="Arial" panose="020B0604020202020204" pitchFamily="34" charset="0"/>
+                <a:cs typeface="Arial" panose="020B0604020202020204" pitchFamily="34" charset="0"/>
+              </a:rPr>
+              <a:t>V rámci consumer grupy je každý záznam přečten jednou</a:t>
+            </a:r>
+            <a:endParaRPr lang="en-US" dirty="0">
+              <a:solidFill>
+                <a:schemeClr val="tx2"/>
+              </a:solidFill>
+              <a:latin typeface="Arial" panose="020B0604020202020204" pitchFamily="34" charset="0"/>
+              <a:cs typeface="Arial" panose="020B0604020202020204" pitchFamily="34" charset="0"/>
+            </a:endParaRPr>
+          </a:p>
+        </p:txBody>
+      </p:sp>
     </p:spTree>
     <p:extLst>
       <p:ext uri="{BB962C8B-B14F-4D97-AF65-F5344CB8AC3E}">
@@ -16456,6 +16832,51 @@
                                           </p:stCondLst>
                                         </p:cTn>
                                         <p:tgtEl>
+                                          <p:spTgt spid="1079"/>
+                                        </p:tgtEl>
+                                        <p:attrNameLst>
+                                          <p:attrName>style.visibility</p:attrName>
+                                        </p:attrNameLst>
+                                      </p:cBhvr>
+                                      <p:to>
+                                        <p:strVal val="visible"/>
+                                      </p:to>
+                                    </p:set>
+                                  </p:childTnLst>
+                                </p:cTn>
+                              </p:par>
+                            </p:childTnLst>
+                          </p:cTn>
+                        </p:par>
+                      </p:childTnLst>
+                    </p:cTn>
+                  </p:par>
+                  <p:par>
+                    <p:cTn id="23" fill="hold">
+                      <p:stCondLst>
+                        <p:cond delay="indefinite"/>
+                      </p:stCondLst>
+                      <p:childTnLst>
+                        <p:par>
+                          <p:cTn id="24" fill="hold">
+                            <p:stCondLst>
+                              <p:cond delay="0"/>
+                            </p:stCondLst>
+                            <p:childTnLst>
+                              <p:par>
+                                <p:cTn id="25" presetID="1" presetClass="entr" presetSubtype="0" fill="hold" grpId="0" nodeType="clickEffect">
+                                  <p:stCondLst>
+                                    <p:cond delay="0"/>
+                                  </p:stCondLst>
+                                  <p:childTnLst>
+                                    <p:set>
+                                      <p:cBhvr>
+                                        <p:cTn id="26" dur="1" fill="hold">
+                                          <p:stCondLst>
+                                            <p:cond delay="0"/>
+                                          </p:stCondLst>
+                                        </p:cTn>
+                                        <p:tgtEl>
                                           <p:spTgt spid="1062"/>
                                         </p:tgtEl>
                                         <p:attrNameLst>
@@ -16470,14 +16891,14 @@
                                 </p:cTn>
                               </p:par>
                               <p:par>
-                                <p:cTn id="23" presetID="1" presetClass="exit" presetSubtype="0" fill="hold" nodeType="withEffect">
+                                <p:cTn id="27" presetID="1" presetClass="exit" presetSubtype="0" fill="hold" nodeType="withEffect">
                                   <p:stCondLst>
                                     <p:cond delay="0"/>
                                   </p:stCondLst>
                                   <p:childTnLst>
                                     <p:set>
                                       <p:cBhvr>
-                                        <p:cTn id="24" dur="1" fill="hold">
+                                        <p:cTn id="28" dur="1" fill="hold">
                                           <p:stCondLst>
                                             <p:cond delay="0"/>
                                           </p:stCondLst>
@@ -16497,14 +16918,14 @@
                                 </p:cTn>
                               </p:par>
                               <p:par>
-                                <p:cTn id="25" presetID="1" presetClass="entr" presetSubtype="0" fill="hold" nodeType="withEffect">
+                                <p:cTn id="29" presetID="1" presetClass="entr" presetSubtype="0" fill="hold" nodeType="withEffect">
                                   <p:stCondLst>
                                     <p:cond delay="0"/>
                                   </p:stCondLst>
                                   <p:childTnLst>
                                     <p:set>
                                       <p:cBhvr>
-                                        <p:cTn id="26" dur="1" fill="hold">
+                                        <p:cTn id="30" dur="1" fill="hold">
                                           <p:stCondLst>
                                             <p:cond delay="0"/>
                                           </p:stCondLst>
@@ -16524,14 +16945,14 @@
                                 </p:cTn>
                               </p:par>
                               <p:par>
-                                <p:cTn id="27" presetID="1" presetClass="entr" presetSubtype="0" fill="hold" nodeType="withEffect">
+                                <p:cTn id="31" presetID="1" presetClass="entr" presetSubtype="0" fill="hold" nodeType="withEffect">
                                   <p:stCondLst>
                                     <p:cond delay="0"/>
                                   </p:stCondLst>
                                   <p:childTnLst>
                                     <p:set>
                                       <p:cBhvr>
-                                        <p:cTn id="28" dur="1" fill="hold">
+                                        <p:cTn id="32" dur="1" fill="hold">
                                           <p:stCondLst>
                                             <p:cond delay="0"/>
                                           </p:stCondLst>
@@ -16551,14 +16972,14 @@
                                 </p:cTn>
                               </p:par>
                               <p:par>
-                                <p:cTn id="29" presetID="1" presetClass="exit" presetSubtype="0" fill="hold" nodeType="withEffect">
+                                <p:cTn id="33" presetID="1" presetClass="exit" presetSubtype="0" fill="hold" nodeType="withEffect">
                                   <p:stCondLst>
                                     <p:cond delay="0"/>
                                   </p:stCondLst>
                                   <p:childTnLst>
                                     <p:set>
                                       <p:cBhvr>
-                                        <p:cTn id="30" dur="1" fill="hold">
+                                        <p:cTn id="34" dur="1" fill="hold">
                                           <p:stCondLst>
                                             <p:cond delay="0"/>
                                           </p:stCondLst>
@@ -16609,6 +17030,7 @@
       <p:bldP spid="1034" grpId="0"/>
       <p:bldP spid="1037" grpId="0"/>
       <p:bldP spid="1062" grpId="0"/>
+      <p:bldP spid="1079" grpId="0"/>
     </p:bldLst>
   </p:timing>
 </p:sld>
@@ -17360,7 +17782,7 @@
         <p:spPr>
           <a:xfrm>
             <a:off x="1200357" y="1994234"/>
-            <a:ext cx="7150984" cy="2684004"/>
+            <a:ext cx="7150984" cy="3238002"/>
           </a:xfrm>
           <a:prstGeom prst="rect">
             <a:avLst/>
@@ -17474,6 +17896,27 @@
                 <a:latin typeface="Arial" panose="020B0604020202020204" pitchFamily="34" charset="0"/>
                 <a:cs typeface="Arial" panose="020B0604020202020204" pitchFamily="34" charset="0"/>
               </a:rPr>
+              <a:t>Připojení na Kafku přes portforwarding</a:t>
+            </a:r>
+          </a:p>
+          <a:p>
+            <a:pPr marL="171450" indent="-171450" algn="l">
+              <a:lnSpc>
+                <a:spcPct val="200000"/>
+              </a:lnSpc>
+              <a:buFont typeface="Wingdings" pitchFamily="2" charset="2"/>
+              <a:buChar char="§"/>
+            </a:pPr>
+            <a:r>
+              <a:rPr lang="en-US" dirty="0">
+                <a:solidFill>
+                  <a:schemeClr val="accent2">
+                    <a:lumMod val="50000"/>
+                  </a:schemeClr>
+                </a:solidFill>
+                <a:latin typeface="Arial" panose="020B0604020202020204" pitchFamily="34" charset="0"/>
+                <a:cs typeface="Arial" panose="020B0604020202020204" pitchFamily="34" charset="0"/>
+              </a:rPr>
               <a:t>Q&amp;A, než se vydáme dál</a:t>
             </a:r>
           </a:p>
@@ -17494,7 +17937,7 @@
           <p:nvPr/>
         </p:nvPicPr>
         <p:blipFill>
-          <a:blip r:embed="rId2"/>
+          <a:blip r:embed="rId3"/>
           <a:stretch>
             <a:fillRect/>
           </a:stretch>
@@ -17766,15 +18209,64 @@
                                   </p:childTnLst>
                                 </p:cTn>
                               </p:par>
+                            </p:childTnLst>
+                          </p:cTn>
+                        </p:par>
+                      </p:childTnLst>
+                    </p:cTn>
+                  </p:par>
+                  <p:par>
+                    <p:cTn id="23" fill="hold">
+                      <p:stCondLst>
+                        <p:cond delay="indefinite"/>
+                      </p:stCondLst>
+                      <p:childTnLst>
+                        <p:par>
+                          <p:cTn id="24" fill="hold">
+                            <p:stCondLst>
+                              <p:cond delay="0"/>
+                            </p:stCondLst>
+                            <p:childTnLst>
                               <p:par>
-                                <p:cTn id="23" presetID="37" presetClass="entr" presetSubtype="0" fill="hold" nodeType="withEffect">
+                                <p:cTn id="25" presetID="1" presetClass="entr" presetSubtype="0" fill="hold" grpId="0" nodeType="clickEffect">
                                   <p:stCondLst>
                                     <p:cond delay="0"/>
                                   </p:stCondLst>
                                   <p:childTnLst>
                                     <p:set>
                                       <p:cBhvr>
-                                        <p:cTn id="24" dur="1" fill="hold">
+                                        <p:cTn id="26" dur="1" fill="hold">
+                                          <p:stCondLst>
+                                            <p:cond delay="0"/>
+                                          </p:stCondLst>
+                                        </p:cTn>
+                                        <p:tgtEl>
+                                          <p:spTgt spid="11">
+                                            <p:txEl>
+                                              <p:pRg st="5" end="5"/>
+                                            </p:txEl>
+                                          </p:spTgt>
+                                        </p:tgtEl>
+                                        <p:attrNameLst>
+                                          <p:attrName>style.visibility</p:attrName>
+                                        </p:attrNameLst>
+                                      </p:cBhvr>
+                                      <p:to>
+                                        <p:strVal val="visible"/>
+                                      </p:to>
+                                    </p:set>
+                                  </p:childTnLst>
+                                </p:cTn>
+                              </p:par>
+                              <p:par>
+                                <p:cTn id="27" presetID="37" presetClass="entr" presetSubtype="0" fill="hold" nodeType="withEffect">
+                                  <p:stCondLst>
+                                    <p:cond delay="0"/>
+                                  </p:stCondLst>
+                                  <p:childTnLst>
+                                    <p:set>
+                                      <p:cBhvr>
+                                        <p:cTn id="28" dur="1" fill="hold">
                                           <p:stCondLst>
                                             <p:cond delay="0"/>
                                           </p:stCondLst>
@@ -17792,7 +18284,7 @@
                                     </p:set>
                                     <p:animEffect transition="in" filter="fade">
                                       <p:cBhvr>
-                                        <p:cTn id="25" dur="1000"/>
+                                        <p:cTn id="29" dur="1000"/>
                                         <p:tgtEl>
                                           <p:spTgt spid="12"/>
                                         </p:tgtEl>
@@ -17800,7 +18292,7 @@
                                     </p:animEffect>
                                     <p:anim calcmode="lin" valueType="num">
                                       <p:cBhvr>
-                                        <p:cTn id="26" dur="1000" fill="hold"/>
+                                        <p:cTn id="30" dur="1000" fill="hold"/>
                                         <p:tgtEl>
                                           <p:spTgt spid="12"/>
                                         </p:tgtEl>
@@ -17823,7 +18315,7 @@
                                     </p:anim>
                                     <p:anim calcmode="lin" valueType="num">
                                       <p:cBhvr>
-                                        <p:cTn id="27" dur="900" decel="100000" fill="hold"/>
+                                        <p:cTn id="31" dur="900" decel="100000" fill="hold"/>
                                         <p:tgtEl>
                                           <p:spTgt spid="12"/>
                                         </p:tgtEl>
@@ -17846,7 +18338,7 @@
                                     </p:anim>
                                     <p:anim calcmode="lin" valueType="num">
                                       <p:cBhvr>
-                                        <p:cTn id="28" dur="100" accel="100000" fill="hold">
+                                        <p:cTn id="32" dur="100" accel="100000" fill="hold">
                                           <p:stCondLst>
                                             <p:cond delay="900"/>
                                           </p:stCondLst>

</xml_diff>